<commit_message>
CloudTrail solution refactor to include items listed in issue Refactor CloudTrail solution #11
</commit_message>
<xml_diff>
--- a/solutions/cloudtrail/cloudtrail-org/documentation/Organization-CloudTrail-Diagram.pptx
+++ b/solutions/cloudtrail/cloudtrail-org/documentation/Organization-CloudTrail-Diagram.pptx
@@ -259,7 +259,7 @@
           <a:p>
             <a:fld id="{E5B0E223-1B92-604B-9DB5-409A30BBDC46}" type="datetimeFigureOut">
               <a:rPr lang="en-US" smtClean="0"/>
-              <a:t>9/10/20</a:t>
+              <a:t>4/13/21</a:t>
             </a:fld>
             <a:endParaRPr lang="en-US"/>
           </a:p>
@@ -457,7 +457,7 @@
           <a:p>
             <a:fld id="{E5B0E223-1B92-604B-9DB5-409A30BBDC46}" type="datetimeFigureOut">
               <a:rPr lang="en-US" smtClean="0"/>
-              <a:t>9/10/20</a:t>
+              <a:t>4/13/21</a:t>
             </a:fld>
             <a:endParaRPr lang="en-US"/>
           </a:p>
@@ -665,7 +665,7 @@
           <a:p>
             <a:fld id="{E5B0E223-1B92-604B-9DB5-409A30BBDC46}" type="datetimeFigureOut">
               <a:rPr lang="en-US" smtClean="0"/>
-              <a:t>9/10/20</a:t>
+              <a:t>4/13/21</a:t>
             </a:fld>
             <a:endParaRPr lang="en-US"/>
           </a:p>
@@ -863,7 +863,7 @@
           <a:p>
             <a:fld id="{E5B0E223-1B92-604B-9DB5-409A30BBDC46}" type="datetimeFigureOut">
               <a:rPr lang="en-US" smtClean="0"/>
-              <a:t>9/10/20</a:t>
+              <a:t>4/13/21</a:t>
             </a:fld>
             <a:endParaRPr lang="en-US"/>
           </a:p>
@@ -1138,7 +1138,7 @@
           <a:p>
             <a:fld id="{E5B0E223-1B92-604B-9DB5-409A30BBDC46}" type="datetimeFigureOut">
               <a:rPr lang="en-US" smtClean="0"/>
-              <a:t>9/10/20</a:t>
+              <a:t>4/13/21</a:t>
             </a:fld>
             <a:endParaRPr lang="en-US"/>
           </a:p>
@@ -1403,7 +1403,7 @@
           <a:p>
             <a:fld id="{E5B0E223-1B92-604B-9DB5-409A30BBDC46}" type="datetimeFigureOut">
               <a:rPr lang="en-US" smtClean="0"/>
-              <a:t>9/10/20</a:t>
+              <a:t>4/13/21</a:t>
             </a:fld>
             <a:endParaRPr lang="en-US"/>
           </a:p>
@@ -1815,7 +1815,7 @@
           <a:p>
             <a:fld id="{E5B0E223-1B92-604B-9DB5-409A30BBDC46}" type="datetimeFigureOut">
               <a:rPr lang="en-US" smtClean="0"/>
-              <a:t>9/10/20</a:t>
+              <a:t>4/13/21</a:t>
             </a:fld>
             <a:endParaRPr lang="en-US"/>
           </a:p>
@@ -1956,7 +1956,7 @@
           <a:p>
             <a:fld id="{E5B0E223-1B92-604B-9DB5-409A30BBDC46}" type="datetimeFigureOut">
               <a:rPr lang="en-US" smtClean="0"/>
-              <a:t>9/10/20</a:t>
+              <a:t>4/13/21</a:t>
             </a:fld>
             <a:endParaRPr lang="en-US"/>
           </a:p>
@@ -2069,7 +2069,7 @@
           <a:p>
             <a:fld id="{E5B0E223-1B92-604B-9DB5-409A30BBDC46}" type="datetimeFigureOut">
               <a:rPr lang="en-US" smtClean="0"/>
-              <a:t>9/10/20</a:t>
+              <a:t>4/13/21</a:t>
             </a:fld>
             <a:endParaRPr lang="en-US"/>
           </a:p>
@@ -2380,7 +2380,7 @@
           <a:p>
             <a:fld id="{E5B0E223-1B92-604B-9DB5-409A30BBDC46}" type="datetimeFigureOut">
               <a:rPr lang="en-US" smtClean="0"/>
-              <a:t>9/10/20</a:t>
+              <a:t>4/13/21</a:t>
             </a:fld>
             <a:endParaRPr lang="en-US"/>
           </a:p>
@@ -2668,7 +2668,7 @@
           <a:p>
             <a:fld id="{E5B0E223-1B92-604B-9DB5-409A30BBDC46}" type="datetimeFigureOut">
               <a:rPr lang="en-US" smtClean="0"/>
-              <a:t>9/10/20</a:t>
+              <a:t>4/13/21</a:t>
             </a:fld>
             <a:endParaRPr lang="en-US"/>
           </a:p>
@@ -2909,7 +2909,7 @@
           <a:p>
             <a:fld id="{E5B0E223-1B92-604B-9DB5-409A30BBDC46}" type="datetimeFigureOut">
               <a:rPr lang="en-US" smtClean="0"/>
-              <a:t>9/10/20</a:t>
+              <a:t>4/13/21</a:t>
             </a:fld>
             <a:endParaRPr lang="en-US"/>
           </a:p>
@@ -3537,11 +3537,7 @@
           <a:prstGeom prst="rect">
             <a:avLst/>
           </a:prstGeom>
-          <a:solidFill>
-            <a:srgbClr val="5A6B86">
-              <a:alpha val="9804"/>
-            </a:srgbClr>
-          </a:solidFill>
+          <a:noFill/>
           <a:ln w="12700">
             <a:solidFill>
               <a:srgbClr val="002060"/>
@@ -3617,11 +3613,7 @@
           <a:prstGeom prst="rect">
             <a:avLst/>
           </a:prstGeom>
-          <a:solidFill>
-            <a:srgbClr val="5A6B86">
-              <a:alpha val="9804"/>
-            </a:srgbClr>
-          </a:solidFill>
+          <a:noFill/>
           <a:ln w="12700">
             <a:solidFill>
               <a:schemeClr val="tx1"/>
@@ -3697,11 +3689,7 @@
           <a:prstGeom prst="rect">
             <a:avLst/>
           </a:prstGeom>
-          <a:solidFill>
-            <a:srgbClr val="5A6B86">
-              <a:alpha val="9804"/>
-            </a:srgbClr>
-          </a:solidFill>
+          <a:noFill/>
           <a:ln w="12700">
             <a:solidFill>
               <a:srgbClr val="002060"/>
@@ -4165,7 +4153,7 @@
         </p:blipFill>
         <p:spPr>
           <a:xfrm>
-            <a:off x="8694763" y="4391799"/>
+            <a:off x="9406282" y="4620117"/>
             <a:ext cx="555156" cy="555156"/>
           </a:xfrm>
           <a:prstGeom prst="rect">
@@ -4187,7 +4175,7 @@
         </p:nvSpPr>
         <p:spPr>
           <a:xfrm>
-            <a:off x="8416793" y="4977216"/>
+            <a:off x="9128312" y="5205534"/>
             <a:ext cx="1205503" cy="646331"/>
           </a:xfrm>
           <a:prstGeom prst="rect">
@@ -4283,156 +4271,6 @@
                 <a:latin typeface="+mn-lt"/>
               </a:rPr>
               <a:t>Organization CloudTrail Bucket</a:t>
-            </a:r>
-          </a:p>
-        </p:txBody>
-      </p:sp>
-      <p:pic>
-        <p:nvPicPr>
-          <p:cNvPr id="21" name="Graphic 1">
-            <a:extLst>
-              <a:ext uri="{FF2B5EF4-FFF2-40B4-BE49-F238E27FC236}">
-                <a16:creationId xmlns:a16="http://schemas.microsoft.com/office/drawing/2014/main" id="{703559DB-4760-8444-B1D3-7FA89B202D59}"/>
-              </a:ext>
-            </a:extLst>
-          </p:cNvPr>
-          <p:cNvPicPr>
-            <a:picLocks noChangeAspect="1"/>
-          </p:cNvPicPr>
-          <p:nvPr/>
-        </p:nvPicPr>
-        <p:blipFill>
-          <a:blip r:embed="rId10">
-            <a:extLst>
-              <a:ext uri="{96DAC541-7B7A-43D3-8B79-37D633B846F1}">
-                <asvg:svgBlip xmlns:asvg="http://schemas.microsoft.com/office/drawing/2016/SVG/main" r:embed="rId11"/>
-              </a:ext>
-            </a:extLst>
-          </a:blip>
-          <a:stretch>
-            <a:fillRect/>
-          </a:stretch>
-        </p:blipFill>
-        <p:spPr>
-          <a:xfrm>
-            <a:off x="10161392" y="4391799"/>
-            <a:ext cx="555156" cy="555156"/>
-          </a:xfrm>
-          <a:prstGeom prst="rect">
-            <a:avLst/>
-          </a:prstGeom>
-        </p:spPr>
-      </p:pic>
-      <p:sp>
-        <p:nvSpPr>
-          <p:cNvPr id="22" name="TextBox 2">
-            <a:extLst>
-              <a:ext uri="{FF2B5EF4-FFF2-40B4-BE49-F238E27FC236}">
-                <a16:creationId xmlns:a16="http://schemas.microsoft.com/office/drawing/2014/main" id="{5C406866-6172-144D-B168-145572BD97A3}"/>
-              </a:ext>
-            </a:extLst>
-          </p:cNvPr>
-          <p:cNvSpPr txBox="1"/>
-          <p:nvPr/>
-        </p:nvSpPr>
-        <p:spPr>
-          <a:xfrm>
-            <a:off x="9767886" y="4964699"/>
-            <a:ext cx="1363027" cy="646331"/>
-          </a:xfrm>
-          <a:prstGeom prst="rect">
-            <a:avLst/>
-          </a:prstGeom>
-          <a:noFill/>
-        </p:spPr>
-        <p:style>
-          <a:lnRef idx="0">
-            <a:scrgbClr r="0" g="0" b="0"/>
-          </a:lnRef>
-          <a:fillRef idx="0">
-            <a:scrgbClr r="0" g="0" b="0"/>
-          </a:fillRef>
-          <a:effectRef idx="0">
-            <a:scrgbClr r="0" g="0" b="0"/>
-          </a:effectRef>
-          <a:fontRef idx="major"/>
-        </p:style>
-        <p:txBody>
-          <a:bodyPr wrap="square" rtlCol="0">
-            <a:spAutoFit/>
-          </a:bodyPr>
-          <a:lstStyle>
-            <a:lvl1pPr>
-              <a:defRPr>
-                <a:latin typeface="+mj-lt"/>
-                <a:ea typeface="+mj-ea"/>
-                <a:cs typeface="+mj-cs"/>
-              </a:defRPr>
-            </a:lvl1pPr>
-            <a:lvl2pPr>
-              <a:defRPr>
-                <a:latin typeface="+mj-lt"/>
-                <a:ea typeface="+mj-ea"/>
-                <a:cs typeface="+mj-cs"/>
-              </a:defRPr>
-            </a:lvl2pPr>
-            <a:lvl3pPr>
-              <a:defRPr>
-                <a:latin typeface="+mj-lt"/>
-                <a:ea typeface="+mj-ea"/>
-                <a:cs typeface="+mj-cs"/>
-              </a:defRPr>
-            </a:lvl3pPr>
-            <a:lvl4pPr>
-              <a:defRPr>
-                <a:latin typeface="+mj-lt"/>
-                <a:ea typeface="+mj-ea"/>
-                <a:cs typeface="+mj-cs"/>
-              </a:defRPr>
-            </a:lvl4pPr>
-            <a:lvl5pPr>
-              <a:defRPr>
-                <a:latin typeface="+mj-lt"/>
-                <a:ea typeface="+mj-ea"/>
-                <a:cs typeface="+mj-cs"/>
-              </a:defRPr>
-            </a:lvl5pPr>
-            <a:lvl6pPr>
-              <a:defRPr>
-                <a:latin typeface="+mj-lt"/>
-                <a:ea typeface="+mj-ea"/>
-                <a:cs typeface="+mj-cs"/>
-              </a:defRPr>
-            </a:lvl6pPr>
-            <a:lvl7pPr>
-              <a:defRPr>
-                <a:latin typeface="+mj-lt"/>
-                <a:ea typeface="+mj-ea"/>
-                <a:cs typeface="+mj-cs"/>
-              </a:defRPr>
-            </a:lvl7pPr>
-            <a:lvl8pPr>
-              <a:defRPr>
-                <a:latin typeface="+mj-lt"/>
-                <a:ea typeface="+mj-ea"/>
-                <a:cs typeface="+mj-cs"/>
-              </a:defRPr>
-            </a:lvl8pPr>
-            <a:lvl9pPr>
-              <a:defRPr>
-                <a:latin typeface="+mj-lt"/>
-                <a:ea typeface="+mj-ea"/>
-                <a:cs typeface="+mj-cs"/>
-              </a:defRPr>
-            </a:lvl9pPr>
-          </a:lstStyle>
-          <a:p>
-            <a:pPr algn="ctr"/>
-            <a:r>
-              <a:rPr lang="en-US" sz="1200" dirty="0">
-                <a:latin typeface="+mn-lt"/>
-              </a:rPr>
-              <a:t>Organization CloudTrail Replicated Bucket</a:t>
             </a:r>
           </a:p>
         </p:txBody>
@@ -5555,123 +5393,6 @@
       </p:cxnSp>
       <p:sp>
         <p:nvSpPr>
-          <p:cNvPr id="50" name="TextBox 49">
-            <a:extLst>
-              <a:ext uri="{FF2B5EF4-FFF2-40B4-BE49-F238E27FC236}">
-                <a16:creationId xmlns:a16="http://schemas.microsoft.com/office/drawing/2014/main" id="{4F3C409B-F0C3-1F40-BC59-2D79ACF9AC07}"/>
-              </a:ext>
-            </a:extLst>
-          </p:cNvPr>
-          <p:cNvSpPr txBox="1"/>
-          <p:nvPr/>
-        </p:nvSpPr>
-        <p:spPr>
-          <a:xfrm>
-            <a:off x="9155996" y="5803545"/>
-            <a:ext cx="1103001" cy="461665"/>
-          </a:xfrm>
-          <a:prstGeom prst="rect">
-            <a:avLst/>
-          </a:prstGeom>
-          <a:noFill/>
-        </p:spPr>
-        <p:txBody>
-          <a:bodyPr wrap="square" rtlCol="0">
-            <a:spAutoFit/>
-          </a:bodyPr>
-          <a:lstStyle/>
-          <a:p>
-            <a:pPr algn="ctr"/>
-            <a:r>
-              <a:rPr lang="en-US" sz="1200" dirty="0"/>
-              <a:t>S3 Replication Role</a:t>
-            </a:r>
-          </a:p>
-        </p:txBody>
-      </p:sp>
-      <p:pic>
-        <p:nvPicPr>
-          <p:cNvPr id="51" name="Graphic 50">
-            <a:extLst>
-              <a:ext uri="{FF2B5EF4-FFF2-40B4-BE49-F238E27FC236}">
-                <a16:creationId xmlns:a16="http://schemas.microsoft.com/office/drawing/2014/main" id="{FBACD954-8D87-F947-B650-01BAD96893A5}"/>
-              </a:ext>
-            </a:extLst>
-          </p:cNvPr>
-          <p:cNvPicPr>
-            <a:picLocks noChangeAspect="1"/>
-          </p:cNvPicPr>
-          <p:nvPr/>
-        </p:nvPicPr>
-        <p:blipFill>
-          <a:blip r:embed="rId14">
-            <a:extLst>
-              <a:ext uri="{96DAC541-7B7A-43D3-8B79-37D633B846F1}">
-                <asvg:svgBlip xmlns:asvg="http://schemas.microsoft.com/office/drawing/2016/SVG/main" r:embed="rId15"/>
-              </a:ext>
-            </a:extLst>
-          </a:blip>
-          <a:stretch>
-            <a:fillRect/>
-          </a:stretch>
-        </p:blipFill>
-        <p:spPr>
-          <a:xfrm>
-            <a:off x="9426227" y="5400782"/>
-            <a:ext cx="469900" cy="469900"/>
-          </a:xfrm>
-          <a:prstGeom prst="rect">
-            <a:avLst/>
-          </a:prstGeom>
-        </p:spPr>
-      </p:pic>
-      <p:cxnSp>
-        <p:nvCxnSpPr>
-          <p:cNvPr id="52" name="Straight Arrow Connector 51">
-            <a:extLst>
-              <a:ext uri="{FF2B5EF4-FFF2-40B4-BE49-F238E27FC236}">
-                <a16:creationId xmlns:a16="http://schemas.microsoft.com/office/drawing/2014/main" id="{2AA06C7D-1507-3B47-9FA8-F5C7D3FA0A2E}"/>
-              </a:ext>
-            </a:extLst>
-          </p:cNvPr>
-          <p:cNvCxnSpPr>
-            <a:cxnSpLocks/>
-          </p:cNvCxnSpPr>
-          <p:nvPr/>
-        </p:nvCxnSpPr>
-        <p:spPr>
-          <a:xfrm>
-            <a:off x="9435242" y="4677958"/>
-            <a:ext cx="486285" cy="0"/>
-          </a:xfrm>
-          <a:prstGeom prst="straightConnector1">
-            <a:avLst/>
-          </a:prstGeom>
-          <a:ln w="12700">
-            <a:solidFill>
-              <a:srgbClr val="545B64"/>
-            </a:solidFill>
-            <a:headEnd type="none" w="med" len="sm"/>
-            <a:tailEnd type="arrow" w="med" len="sm"/>
-          </a:ln>
-        </p:spPr>
-        <p:style>
-          <a:lnRef idx="1">
-            <a:schemeClr val="accent1"/>
-          </a:lnRef>
-          <a:fillRef idx="0">
-            <a:schemeClr val="accent1"/>
-          </a:fillRef>
-          <a:effectRef idx="0">
-            <a:schemeClr val="accent1"/>
-          </a:effectRef>
-          <a:fontRef idx="minor">
-            <a:schemeClr val="tx1"/>
-          </a:fontRef>
-        </p:style>
-      </p:cxnSp>
-      <p:sp>
-        <p:nvSpPr>
           <p:cNvPr id="66" name="Oval 65">
             <a:extLst>
               <a:ext uri="{FF2B5EF4-FFF2-40B4-BE49-F238E27FC236}">
@@ -6244,10 +5965,10 @@
       </p:sp>
       <p:sp>
         <p:nvSpPr>
-          <p:cNvPr id="77" name="Oval 76">
-            <a:extLst>
-              <a:ext uri="{FF2B5EF4-FFF2-40B4-BE49-F238E27FC236}">
-                <a16:creationId xmlns:a16="http://schemas.microsoft.com/office/drawing/2014/main" id="{91F58A88-3CDE-9643-93B6-8636F59DC29A}"/>
+          <p:cNvPr id="78" name="Oval 77">
+            <a:extLst>
+              <a:ext uri="{FF2B5EF4-FFF2-40B4-BE49-F238E27FC236}">
+                <a16:creationId xmlns:a16="http://schemas.microsoft.com/office/drawing/2014/main" id="{AF305BC2-B36B-A546-B854-8F9B49EE61AD}"/>
               </a:ext>
             </a:extLst>
           </p:cNvPr>
@@ -6256,7 +5977,7 @@
         </p:nvSpPr>
         <p:spPr>
           <a:xfrm>
-            <a:off x="9541931" y="5243703"/>
+            <a:off x="6374329" y="3640249"/>
             <a:ext cx="253435" cy="212902"/>
           </a:xfrm>
           <a:prstGeom prst="ellipse">
@@ -6289,17 +6010,17 @@
             <a:pPr algn="ctr"/>
             <a:r>
               <a:rPr lang="en-US" sz="800" dirty="0"/>
-              <a:t>3.4</a:t>
-            </a:r>
-          </a:p>
-        </p:txBody>
-      </p:sp>
-      <p:sp>
-        <p:nvSpPr>
-          <p:cNvPr id="78" name="Oval 77">
-            <a:extLst>
-              <a:ext uri="{FF2B5EF4-FFF2-40B4-BE49-F238E27FC236}">
-                <a16:creationId xmlns:a16="http://schemas.microsoft.com/office/drawing/2014/main" id="{AF305BC2-B36B-A546-B854-8F9B49EE61AD}"/>
+              <a:t>3.0</a:t>
+            </a:r>
+          </a:p>
+        </p:txBody>
+      </p:sp>
+      <p:sp>
+        <p:nvSpPr>
+          <p:cNvPr id="79" name="Oval 78">
+            <a:extLst>
+              <a:ext uri="{FF2B5EF4-FFF2-40B4-BE49-F238E27FC236}">
+                <a16:creationId xmlns:a16="http://schemas.microsoft.com/office/drawing/2014/main" id="{79317247-F07F-6544-BBCA-C9327D54BC39}"/>
               </a:ext>
             </a:extLst>
           </p:cNvPr>
@@ -6308,7 +6029,7 @@
         </p:nvSpPr>
         <p:spPr>
           <a:xfrm>
-            <a:off x="6374329" y="3640249"/>
+            <a:off x="6996185" y="4400755"/>
             <a:ext cx="253435" cy="212902"/>
           </a:xfrm>
           <a:prstGeom prst="ellipse">
@@ -6341,17 +6062,17 @@
             <a:pPr algn="ctr"/>
             <a:r>
               <a:rPr lang="en-US" sz="800" dirty="0"/>
-              <a:t>3.0</a:t>
-            </a:r>
-          </a:p>
-        </p:txBody>
-      </p:sp>
-      <p:sp>
-        <p:nvSpPr>
-          <p:cNvPr id="79" name="Oval 78">
-            <a:extLst>
-              <a:ext uri="{FF2B5EF4-FFF2-40B4-BE49-F238E27FC236}">
-                <a16:creationId xmlns:a16="http://schemas.microsoft.com/office/drawing/2014/main" id="{79317247-F07F-6544-BBCA-C9327D54BC39}"/>
+              <a:t>3.1</a:t>
+            </a:r>
+          </a:p>
+        </p:txBody>
+      </p:sp>
+      <p:sp>
+        <p:nvSpPr>
+          <p:cNvPr id="80" name="Oval 79">
+            <a:extLst>
+              <a:ext uri="{FF2B5EF4-FFF2-40B4-BE49-F238E27FC236}">
+                <a16:creationId xmlns:a16="http://schemas.microsoft.com/office/drawing/2014/main" id="{48C4D317-93F4-5641-8DFB-C87230F448BF}"/>
               </a:ext>
             </a:extLst>
           </p:cNvPr>
@@ -6360,7 +6081,7 @@
         </p:nvSpPr>
         <p:spPr>
           <a:xfrm>
-            <a:off x="6996185" y="4400755"/>
+            <a:off x="9406282" y="4629073"/>
             <a:ext cx="253435" cy="212902"/>
           </a:xfrm>
           <a:prstGeom prst="ellipse">
@@ -6393,111 +6114,7 @@
             <a:pPr algn="ctr"/>
             <a:r>
               <a:rPr lang="en-US" sz="800" dirty="0"/>
-              <a:t>3.1</a:t>
-            </a:r>
-          </a:p>
-        </p:txBody>
-      </p:sp>
-      <p:sp>
-        <p:nvSpPr>
-          <p:cNvPr id="80" name="Oval 79">
-            <a:extLst>
-              <a:ext uri="{FF2B5EF4-FFF2-40B4-BE49-F238E27FC236}">
-                <a16:creationId xmlns:a16="http://schemas.microsoft.com/office/drawing/2014/main" id="{48C4D317-93F4-5641-8DFB-C87230F448BF}"/>
-              </a:ext>
-            </a:extLst>
-          </p:cNvPr>
-          <p:cNvSpPr/>
-          <p:nvPr/>
-        </p:nvSpPr>
-        <p:spPr>
-          <a:xfrm>
-            <a:off x="8694763" y="4400755"/>
-            <a:ext cx="253435" cy="212902"/>
-          </a:xfrm>
-          <a:prstGeom prst="ellipse">
-            <a:avLst/>
-          </a:prstGeom>
-          <a:solidFill>
-            <a:schemeClr val="tx1"/>
-          </a:solidFill>
-        </p:spPr>
-        <p:style>
-          <a:lnRef idx="2">
-            <a:schemeClr val="accent1">
-              <a:shade val="50000"/>
-            </a:schemeClr>
-          </a:lnRef>
-          <a:fillRef idx="1">
-            <a:schemeClr val="accent1"/>
-          </a:fillRef>
-          <a:effectRef idx="0">
-            <a:schemeClr val="accent1"/>
-          </a:effectRef>
-          <a:fontRef idx="minor">
-            <a:schemeClr val="lt1"/>
-          </a:fontRef>
-        </p:style>
-        <p:txBody>
-          <a:bodyPr lIns="0" tIns="0" rIns="0" bIns="0" rtlCol="0" anchor="ctr"/>
-          <a:lstStyle/>
-          <a:p>
-            <a:pPr algn="ctr"/>
-            <a:r>
-              <a:rPr lang="en-US" sz="800" dirty="0"/>
               <a:t>3.2</a:t>
-            </a:r>
-          </a:p>
-        </p:txBody>
-      </p:sp>
-      <p:sp>
-        <p:nvSpPr>
-          <p:cNvPr id="81" name="Oval 80">
-            <a:extLst>
-              <a:ext uri="{FF2B5EF4-FFF2-40B4-BE49-F238E27FC236}">
-                <a16:creationId xmlns:a16="http://schemas.microsoft.com/office/drawing/2014/main" id="{68467A91-5861-514C-9551-6C8D8D976E49}"/>
-              </a:ext>
-            </a:extLst>
-          </p:cNvPr>
-          <p:cNvSpPr/>
-          <p:nvPr/>
-        </p:nvSpPr>
-        <p:spPr>
-          <a:xfrm>
-            <a:off x="10150564" y="4391799"/>
-            <a:ext cx="253435" cy="212902"/>
-          </a:xfrm>
-          <a:prstGeom prst="ellipse">
-            <a:avLst/>
-          </a:prstGeom>
-          <a:solidFill>
-            <a:schemeClr val="tx1"/>
-          </a:solidFill>
-        </p:spPr>
-        <p:style>
-          <a:lnRef idx="2">
-            <a:schemeClr val="accent1">
-              <a:shade val="50000"/>
-            </a:schemeClr>
-          </a:lnRef>
-          <a:fillRef idx="1">
-            <a:schemeClr val="accent1"/>
-          </a:fillRef>
-          <a:effectRef idx="0">
-            <a:schemeClr val="accent1"/>
-          </a:effectRef>
-          <a:fontRef idx="minor">
-            <a:schemeClr val="lt1"/>
-          </a:fontRef>
-        </p:style>
-        <p:txBody>
-          <a:bodyPr lIns="0" tIns="0" rIns="0" bIns="0" rtlCol="0" anchor="ctr"/>
-          <a:lstStyle/>
-          <a:p>
-            <a:pPr algn="ctr"/>
-            <a:r>
-              <a:rPr lang="en-US" sz="800" dirty="0"/>
-              <a:t>3.3</a:t>
             </a:r>
           </a:p>
         </p:txBody>

</xml_diff>